<commit_message>
Fix the colour channel; use a template with the legend on top and the graph spanning the full width of the page.
</commit_message>
<xml_diff>
--- a/webapp/core/src/main/resources/templates/dategraph.pptx
+++ b/webapp/core/src/main/resources/templates/dategraph.pptx
@@ -133,9 +133,9 @@
           <c:layoutTarget val="inner"/>
           <c:xMode val="edge"/>
           <c:yMode val="edge"/>
-          <c:x val="0.21326537893700784"/>
+          <c:x val="3.8399524278215226E-2"/>
           <c:y val="0.18198368713190902"/>
-          <c:w val="0.5453442421259842"/>
+          <c:w val="0.92320095144356951"/>
           <c:h val="0.81801631286809096"/>
         </c:manualLayout>
       </c:layout>
@@ -562,8 +562,8 @@
         </c:dLbls>
         <c:marker val="1"/>
         <c:smooth val="0"/>
-        <c:axId val="87634160"/>
-        <c:axId val="87634552"/>
+        <c:axId val="124642280"/>
+        <c:axId val="88747760"/>
       </c:lineChart>
       <c:lineChart>
         <c:grouping val="standard"/>
@@ -862,11 +862,11 @@
         </c:dLbls>
         <c:marker val="1"/>
         <c:smooth val="0"/>
-        <c:axId val="160313824"/>
-        <c:axId val="87639256"/>
+        <c:axId val="125723208"/>
+        <c:axId val="166357024"/>
       </c:lineChart>
       <c:dateAx>
-        <c:axId val="87634160"/>
+        <c:axId val="124642280"/>
         <c:scaling>
           <c:orientation val="minMax"/>
         </c:scaling>
@@ -909,14 +909,14 @@
             <a:endParaRPr lang="en-US"/>
           </a:p>
         </c:txPr>
-        <c:crossAx val="87634552"/>
+        <c:crossAx val="88747760"/>
         <c:crosses val="autoZero"/>
         <c:auto val="0"/>
         <c:lblOffset val="100"/>
         <c:baseTimeUnit val="months"/>
       </c:dateAx>
       <c:valAx>
-        <c:axId val="87634552"/>
+        <c:axId val="88747760"/>
         <c:scaling>
           <c:orientation val="minMax"/>
         </c:scaling>
@@ -967,12 +967,12 @@
             <a:endParaRPr lang="en-US"/>
           </a:p>
         </c:txPr>
-        <c:crossAx val="87634160"/>
+        <c:crossAx val="124642280"/>
         <c:crosses val="autoZero"/>
         <c:crossBetween val="between"/>
       </c:valAx>
       <c:valAx>
-        <c:axId val="87639256"/>
+        <c:axId val="166357024"/>
         <c:scaling>
           <c:orientation val="minMax"/>
         </c:scaling>
@@ -1009,12 +1009,12 @@
             <a:endParaRPr lang="en-US"/>
           </a:p>
         </c:txPr>
-        <c:crossAx val="160313824"/>
+        <c:crossAx val="125723208"/>
         <c:crosses val="max"/>
         <c:crossBetween val="between"/>
       </c:valAx>
       <c:dateAx>
-        <c:axId val="160313824"/>
+        <c:axId val="125723208"/>
         <c:scaling>
           <c:orientation val="minMax"/>
         </c:scaling>
@@ -1024,7 +1024,8 @@
         <c:majorTickMark val="out"/>
         <c:minorTickMark val="none"/>
         <c:tickLblPos val="nextTo"/>
-        <c:crossAx val="87639256"/>
+        <c:crossAx val="166357024"/>
+        <c:crosses val="autoZero"/>
         <c:auto val="1"/>
         <c:lblOffset val="100"/>
         <c:baseTimeUnit val="months"/>
@@ -1040,7 +1041,7 @@
       </c:spPr>
     </c:plotArea>
     <c:legend>
-      <c:legendPos val="r"/>
+      <c:legendPos val="t"/>
       <c:layout/>
       <c:overlay val="0"/>
       <c:spPr>
@@ -1788,7 +1789,7 @@
           <a:p>
             <a:fld id="{883BD084-2C06-41D0-A826-B3CA4EDA1986}" type="datetimeFigureOut">
               <a:rPr lang="en-GB" smtClean="0"/>
-              <a:t>02/02/2017</a:t>
+              <a:t>03/02/2017</a:t>
             </a:fld>
             <a:endParaRPr lang="en-GB"/>
           </a:p>
@@ -1958,7 +1959,7 @@
           <a:p>
             <a:fld id="{883BD084-2C06-41D0-A826-B3CA4EDA1986}" type="datetimeFigureOut">
               <a:rPr lang="en-GB" smtClean="0"/>
-              <a:t>02/02/2017</a:t>
+              <a:t>03/02/2017</a:t>
             </a:fld>
             <a:endParaRPr lang="en-GB"/>
           </a:p>
@@ -2138,7 +2139,7 @@
           <a:p>
             <a:fld id="{883BD084-2C06-41D0-A826-B3CA4EDA1986}" type="datetimeFigureOut">
               <a:rPr lang="en-GB" smtClean="0"/>
-              <a:t>02/02/2017</a:t>
+              <a:t>03/02/2017</a:t>
             </a:fld>
             <a:endParaRPr lang="en-GB"/>
           </a:p>
@@ -2308,7 +2309,7 @@
           <a:p>
             <a:fld id="{883BD084-2C06-41D0-A826-B3CA4EDA1986}" type="datetimeFigureOut">
               <a:rPr lang="en-GB" smtClean="0"/>
-              <a:t>02/02/2017</a:t>
+              <a:t>03/02/2017</a:t>
             </a:fld>
             <a:endParaRPr lang="en-GB"/>
           </a:p>
@@ -2554,7 +2555,7 @@
           <a:p>
             <a:fld id="{883BD084-2C06-41D0-A826-B3CA4EDA1986}" type="datetimeFigureOut">
               <a:rPr lang="en-GB" smtClean="0"/>
-              <a:t>02/02/2017</a:t>
+              <a:t>03/02/2017</a:t>
             </a:fld>
             <a:endParaRPr lang="en-GB"/>
           </a:p>
@@ -2786,7 +2787,7 @@
           <a:p>
             <a:fld id="{883BD084-2C06-41D0-A826-B3CA4EDA1986}" type="datetimeFigureOut">
               <a:rPr lang="en-GB" smtClean="0"/>
-              <a:t>02/02/2017</a:t>
+              <a:t>03/02/2017</a:t>
             </a:fld>
             <a:endParaRPr lang="en-GB"/>
           </a:p>
@@ -3153,7 +3154,7 @@
           <a:p>
             <a:fld id="{883BD084-2C06-41D0-A826-B3CA4EDA1986}" type="datetimeFigureOut">
               <a:rPr lang="en-GB" smtClean="0"/>
-              <a:t>02/02/2017</a:t>
+              <a:t>03/02/2017</a:t>
             </a:fld>
             <a:endParaRPr lang="en-GB"/>
           </a:p>
@@ -3271,7 +3272,7 @@
           <a:p>
             <a:fld id="{883BD084-2C06-41D0-A826-B3CA4EDA1986}" type="datetimeFigureOut">
               <a:rPr lang="en-GB" smtClean="0"/>
-              <a:t>02/02/2017</a:t>
+              <a:t>03/02/2017</a:t>
             </a:fld>
             <a:endParaRPr lang="en-GB"/>
           </a:p>
@@ -3366,7 +3367,7 @@
           <a:p>
             <a:fld id="{883BD084-2C06-41D0-A826-B3CA4EDA1986}" type="datetimeFigureOut">
               <a:rPr lang="en-GB" smtClean="0"/>
-              <a:t>02/02/2017</a:t>
+              <a:t>03/02/2017</a:t>
             </a:fld>
             <a:endParaRPr lang="en-GB"/>
           </a:p>
@@ -3643,7 +3644,7 @@
           <a:p>
             <a:fld id="{883BD084-2C06-41D0-A826-B3CA4EDA1986}" type="datetimeFigureOut">
               <a:rPr lang="en-GB" smtClean="0"/>
-              <a:t>02/02/2017</a:t>
+              <a:t>03/02/2017</a:t>
             </a:fld>
             <a:endParaRPr lang="en-GB"/>
           </a:p>
@@ -3896,7 +3897,7 @@
           <a:p>
             <a:fld id="{883BD084-2C06-41D0-A826-B3CA4EDA1986}" type="datetimeFigureOut">
               <a:rPr lang="en-GB" smtClean="0"/>
-              <a:t>02/02/2017</a:t>
+              <a:t>03/02/2017</a:t>
             </a:fld>
             <a:endParaRPr lang="en-GB"/>
           </a:p>
@@ -4109,7 +4110,7 @@
           <a:p>
             <a:fld id="{883BD084-2C06-41D0-A826-B3CA4EDA1986}" type="datetimeFigureOut">
               <a:rPr lang="en-GB" smtClean="0"/>
-              <a:t>02/02/2017</a:t>
+              <a:t>03/02/2017</a:t>
             </a:fld>
             <a:endParaRPr lang="en-GB"/>
           </a:p>
@@ -4521,7 +4522,7 @@
           <p:nvPr>
             <p:extLst>
               <p:ext uri="{D42A27DB-BD31-4B8C-83A1-F6EECF244321}">
-                <p14:modId xmlns:p14="http://schemas.microsoft.com/office/powerpoint/2010/main" val="3645906619"/>
+                <p14:modId xmlns:p14="http://schemas.microsoft.com/office/powerpoint/2010/main" val="2034357199"/>
               </p:ext>
             </p:extLst>
           </p:nvPr>

</xml_diff>